<commit_message>
feat: enhance image handling and logging in gerarCertificado utility
</commit_message>
<xml_diff>
--- a/public/templates/certificado/verso-3a-2coluna.pptx
+++ b/public/templates/certificado/verso-3a-2coluna.pptx
@@ -4208,10 +4208,10 @@
       </p:pic>
       <p:pic>
         <p:nvPicPr>
-          <p:cNvPr id="9" name="Imagem 8">
+          <p:cNvPr id="4" name="Imagem 3" descr="Forma&#10;&#10;O conteúdo gerado por IA pode estar incorreto.">
             <a:extLst>
               <a:ext uri="{FF2B5EF4-FFF2-40B4-BE49-F238E27FC236}">
-                <a16:creationId xmlns:a16="http://schemas.microsoft.com/office/drawing/2014/main" id="{BAE094AB-0886-3E4E-7A1D-A6E214F758D9}"/>
+                <a16:creationId xmlns:a16="http://schemas.microsoft.com/office/drawing/2014/main" id="{B2B33398-0FF7-CCBE-A3AA-3F3F179BDE0F}"/>
               </a:ext>
             </a:extLst>
           </p:cNvPr>
@@ -4228,13 +4228,14 @@
               </a:ext>
             </a:extLst>
           </a:blip>
-          <a:srcRect/>
-          <a:stretch/>
+          <a:stretch>
+            <a:fillRect/>
+          </a:stretch>
         </p:blipFill>
         <p:spPr>
           <a:xfrm>
-            <a:off x="7369511" y="3540044"/>
-            <a:ext cx="1364400" cy="1234800"/>
+            <a:off x="7438116" y="3551034"/>
+            <a:ext cx="1332000" cy="1224000"/>
           </a:xfrm>
           <a:prstGeom prst="rect">
             <a:avLst/>

</xml_diff>